<commit_message>
change title, revise questions
</commit_message>
<xml_diff>
--- a/Clinics7_7_16.pptx
+++ b/Clinics7_7_16.pptx
@@ -110,7 +110,7 @@
   </p:defaultTextStyle>
   <p:extLst>
     <p:ext uri="{EFAFB233-063F-42B5-8137-9DF3F51BA10A}">
-      <p15:sldGuideLst xmlns="" xmlns:p15="http://schemas.microsoft.com/office/powerpoint/2012/main">
+      <p15:sldGuideLst xmlns:p15="http://schemas.microsoft.com/office/powerpoint/2012/main" xmlns="">
         <p15:guide id="1" orient="horz" pos="2160">
           <p15:clr>
             <a:srgbClr val="A4A3A4"/>
@@ -327,7 +327,7 @@
             <a:fld id="{F739FEB4-91A7-40B9-8302-0061A33D9BCC}" type="datetimeFigureOut">
               <a:rPr lang="en-US" smtClean="0"/>
               <a:pPr/>
-              <a:t>7/6/2016</a:t>
+              <a:t>7/7/2016</a:t>
             </a:fld>
             <a:endParaRPr lang="en-US"/>
           </a:p>
@@ -525,7 +525,7 @@
           <a:p>
             <a:fld id="{F739FEB4-91A7-40B9-8302-0061A33D9BCC}" type="datetimeFigureOut">
               <a:rPr lang="en-US" smtClean="0"/>
-              <a:t>7/6/2016</a:t>
+              <a:t>7/7/2016</a:t>
             </a:fld>
             <a:endParaRPr lang="en-US"/>
           </a:p>
@@ -705,7 +705,7 @@
           <a:p>
             <a:fld id="{F739FEB4-91A7-40B9-8302-0061A33D9BCC}" type="datetimeFigureOut">
               <a:rPr lang="en-US" smtClean="0"/>
-              <a:t>7/6/2016</a:t>
+              <a:t>7/7/2016</a:t>
             </a:fld>
             <a:endParaRPr lang="en-US"/>
           </a:p>
@@ -875,7 +875,7 @@
           <a:p>
             <a:fld id="{F739FEB4-91A7-40B9-8302-0061A33D9BCC}" type="datetimeFigureOut">
               <a:rPr lang="en-US" smtClean="0"/>
-              <a:t>7/6/2016</a:t>
+              <a:t>7/7/2016</a:t>
             </a:fld>
             <a:endParaRPr lang="en-US"/>
           </a:p>
@@ -1121,7 +1121,7 @@
           <a:p>
             <a:fld id="{F739FEB4-91A7-40B9-8302-0061A33D9BCC}" type="datetimeFigureOut">
               <a:rPr lang="en-US" smtClean="0"/>
-              <a:t>7/6/2016</a:t>
+              <a:t>7/7/2016</a:t>
             </a:fld>
             <a:endParaRPr lang="en-US"/>
           </a:p>
@@ -1409,7 +1409,7 @@
           <a:p>
             <a:fld id="{F739FEB4-91A7-40B9-8302-0061A33D9BCC}" type="datetimeFigureOut">
               <a:rPr lang="en-US" smtClean="0"/>
-              <a:t>7/6/2016</a:t>
+              <a:t>7/7/2016</a:t>
             </a:fld>
             <a:endParaRPr lang="en-US"/>
           </a:p>
@@ -1831,7 +1831,7 @@
           <a:p>
             <a:fld id="{F739FEB4-91A7-40B9-8302-0061A33D9BCC}" type="datetimeFigureOut">
               <a:rPr lang="en-US" smtClean="0"/>
-              <a:t>7/6/2016</a:t>
+              <a:t>7/7/2016</a:t>
             </a:fld>
             <a:endParaRPr lang="en-US"/>
           </a:p>
@@ -1949,7 +1949,7 @@
           <a:p>
             <a:fld id="{F739FEB4-91A7-40B9-8302-0061A33D9BCC}" type="datetimeFigureOut">
               <a:rPr lang="en-US" smtClean="0"/>
-              <a:t>7/6/2016</a:t>
+              <a:t>7/7/2016</a:t>
             </a:fld>
             <a:endParaRPr lang="en-US"/>
           </a:p>
@@ -2044,7 +2044,7 @@
           <a:p>
             <a:fld id="{F739FEB4-91A7-40B9-8302-0061A33D9BCC}" type="datetimeFigureOut">
               <a:rPr lang="en-US" smtClean="0"/>
-              <a:t>7/6/2016</a:t>
+              <a:t>7/7/2016</a:t>
             </a:fld>
             <a:endParaRPr lang="en-US"/>
           </a:p>
@@ -2321,7 +2321,7 @@
           <a:p>
             <a:fld id="{F739FEB4-91A7-40B9-8302-0061A33D9BCC}" type="datetimeFigureOut">
               <a:rPr lang="en-US" smtClean="0"/>
-              <a:t>7/6/2016</a:t>
+              <a:t>7/7/2016</a:t>
             </a:fld>
             <a:endParaRPr lang="en-US"/>
           </a:p>
@@ -2574,7 +2574,7 @@
           <a:p>
             <a:fld id="{F739FEB4-91A7-40B9-8302-0061A33D9BCC}" type="datetimeFigureOut">
               <a:rPr lang="en-US" smtClean="0"/>
-              <a:t>7/6/2016</a:t>
+              <a:t>7/7/2016</a:t>
             </a:fld>
             <a:endParaRPr lang="en-US"/>
           </a:p>
@@ -2789,7 +2789,7 @@
             <a:fld id="{F739FEB4-91A7-40B9-8302-0061A33D9BCC}" type="datetimeFigureOut">
               <a:rPr lang="en-US" smtClean="0"/>
               <a:pPr/>
-              <a:t>7/6/2016</a:t>
+              <a:t>7/7/2016</a:t>
             </a:fld>
             <a:endParaRPr lang="en-US"/>
           </a:p>
@@ -3199,7 +3199,15 @@
             </a:br>
             <a:r>
               <a:rPr lang="en-US" sz="2000" dirty="0" smtClean="0"/>
-              <a:t>Methodology and Progress So Far</a:t>
+              <a:t>Methodology and Progress </a:t>
+            </a:r>
+            <a:r>
+              <a:rPr lang="en-US" sz="2000" dirty="0" smtClean="0"/>
+              <a:t> - So </a:t>
+            </a:r>
+            <a:r>
+              <a:rPr lang="en-US" sz="2000" dirty="0" smtClean="0"/>
+              <a:t>Far</a:t>
             </a:r>
             <a:br>
               <a:rPr lang="en-US" sz="2000" dirty="0" smtClean="0"/>
@@ -3250,15 +3258,7 @@
             </a:pPr>
             <a:r>
               <a:rPr lang="en-US" b="1" dirty="0" smtClean="0"/>
-              <a:t>Created ‘administrator </a:t>
-            </a:r>
-            <a:r>
-              <a:rPr lang="en-US" b="1" dirty="0" smtClean="0"/>
-              <a:t>perceived’ list </a:t>
-            </a:r>
-            <a:r>
-              <a:rPr lang="en-US" b="1" dirty="0" smtClean="0"/>
-              <a:t>of probable problem areas</a:t>
+              <a:t>Created ‘administrator perceived’ list of probable problem areas</a:t>
             </a:r>
           </a:p>
           <a:p>
@@ -3270,29 +3270,12 @@
               <a:rPr lang="en-US" b="1" dirty="0" smtClean="0"/>
               <a:t>Plan: </a:t>
             </a:r>
-            <a:endParaRPr lang="en-US" b="1" dirty="0" smtClean="0"/>
           </a:p>
           <a:p>
             <a:pPr lvl="2"/>
             <a:r>
               <a:rPr lang="en-US" b="1" dirty="0" smtClean="0"/>
-              <a:t>Collect problems </a:t>
-            </a:r>
-            <a:r>
-              <a:rPr lang="en-US" b="1" dirty="0" smtClean="0"/>
-              <a:t>as perceived by </a:t>
-            </a:r>
-            <a:r>
-              <a:rPr lang="en-US" b="1" dirty="0" smtClean="0"/>
-              <a:t>MD’s </a:t>
-            </a:r>
-            <a:r>
-              <a:rPr lang="en-US" b="1" dirty="0" smtClean="0"/>
-              <a:t>and PC’s working in </a:t>
-            </a:r>
-            <a:r>
-              <a:rPr lang="en-US" b="1" dirty="0" smtClean="0"/>
-              <a:t>clinics</a:t>
+              <a:t>Collect problems as perceived by MD’s and PC’s working in clinics</a:t>
             </a:r>
           </a:p>
           <a:p>
@@ -3318,13 +3301,8 @@
             </a:r>
             <a:r>
               <a:rPr lang="en-US" b="1" dirty="0" smtClean="0"/>
-              <a:t> – MD </a:t>
-            </a:r>
-            <a:r>
-              <a:rPr lang="en-US" b="1" dirty="0" smtClean="0"/>
-              <a:t>perceived problems</a:t>
-            </a:r>
-            <a:endParaRPr lang="en-US" b="1" dirty="0" smtClean="0"/>
+              <a:t> – MD perceived problems</a:t>
+            </a:r>
           </a:p>
           <a:p>
             <a:pPr lvl="3">
@@ -3333,11 +3311,7 @@
             </a:pPr>
             <a:r>
               <a:rPr lang="en-US" b="1" dirty="0" smtClean="0"/>
-              <a:t>John Mahon – PC </a:t>
-            </a:r>
-            <a:r>
-              <a:rPr lang="en-US" b="1" dirty="0" smtClean="0"/>
-              <a:t>perceived problems</a:t>
+              <a:t>John Mahon – PC perceived problems</a:t>
             </a:r>
           </a:p>
           <a:p>
@@ -3365,7 +3339,6 @@
               <a:rPr lang="en-US" b="1" dirty="0" smtClean="0"/>
               <a:t>weeks</a:t>
             </a:r>
-            <a:endParaRPr lang="en-US" b="1" dirty="0" smtClean="0"/>
           </a:p>
           <a:p>
             <a:r>
@@ -3394,7 +3367,6 @@
               <a:rPr lang="en-US" b="1" dirty="0" smtClean="0"/>
               <a:t> PC perceived problems to Mentis</a:t>
             </a:r>
-            <a:endParaRPr lang="en-US" b="1" dirty="0" smtClean="0"/>
           </a:p>
           <a:p>
             <a:pPr marL="1828800" lvl="4" indent="0">
@@ -5036,8 +5008,8 @@
         </p:nvSpPr>
         <p:spPr>
           <a:xfrm>
-            <a:off x="5772228" y="457200"/>
-            <a:ext cx="3219371" cy="2462213"/>
+            <a:off x="5653202" y="457200"/>
+            <a:ext cx="3338398" cy="3539430"/>
           </a:xfrm>
           <a:prstGeom prst="rect">
             <a:avLst/>
@@ -5088,7 +5060,15 @@
                   <a:schemeClr val="bg1"/>
                 </a:solidFill>
               </a:rPr>
-              <a:t>Think just summary of data from original 5/11/16 meeting</a:t>
+              <a:t>I think this is summary </a:t>
+            </a:r>
+            <a:r>
+              <a:rPr lang="en-US" sz="1400" b="1" dirty="0" smtClean="0">
+                <a:solidFill>
+                  <a:schemeClr val="bg1"/>
+                </a:solidFill>
+              </a:rPr>
+              <a:t>of data from original 5/11/16 meeting</a:t>
             </a:r>
           </a:p>
           <a:p>
@@ -5102,38 +5082,21 @@
                   <a:schemeClr val="bg1"/>
                 </a:solidFill>
               </a:rPr>
-              <a:t>No PC perceived problems</a:t>
-            </a:r>
-          </a:p>
-          <a:p>
-            <a:pPr marL="285750" indent="-285750">
-              <a:buFont typeface="Arial" panose="020B0604020202020204" pitchFamily="34" charset="0"/>
-              <a:buChar char="•"/>
-            </a:pPr>
+              <a:t>If  true </a:t>
+            </a:r>
             <a:r>
               <a:rPr lang="en-US" sz="1400" b="1" dirty="0" smtClean="0">
                 <a:solidFill>
                   <a:schemeClr val="bg1"/>
                 </a:solidFill>
               </a:rPr>
-              <a:t>?? </a:t>
-            </a:r>
-            <a:r>
-              <a:rPr lang="en-US" sz="1400" b="1" dirty="0" err="1" smtClean="0">
-                <a:solidFill>
-                  <a:schemeClr val="bg1"/>
-                </a:solidFill>
-              </a:rPr>
-              <a:t>wrt</a:t>
-            </a:r>
-            <a:r>
-              <a:rPr lang="en-US" sz="1400" b="1" dirty="0" smtClean="0">
-                <a:solidFill>
-                  <a:schemeClr val="bg1"/>
-                </a:solidFill>
-              </a:rPr>
-              <a:t>: PC  perceived problems:</a:t>
-            </a:r>
+              <a:t>that PCs have problems that have not been identified then:</a:t>
+            </a:r>
+            <a:endParaRPr lang="en-US" sz="1400" b="1" dirty="0" smtClean="0">
+              <a:solidFill>
+                <a:schemeClr val="bg1"/>
+              </a:solidFill>
+            </a:endParaRPr>
           </a:p>
           <a:p>
             <a:pPr marL="742950" lvl="1" indent="-285750">
@@ -5141,12 +5104,12 @@
               <a:buChar char="•"/>
             </a:pPr>
             <a:r>
-              <a:rPr lang="en-US" sz="1400" b="1" dirty="0">
+              <a:rPr lang="en-US" sz="1400" b="1" dirty="0" smtClean="0">
                 <a:solidFill>
                   <a:schemeClr val="bg1"/>
                 </a:solidFill>
               </a:rPr>
-              <a:t>N</a:t>
+              <a:t>Not </a:t>
             </a:r>
             <a:r>
               <a:rPr lang="en-US" sz="1400" b="1" dirty="0" smtClean="0">
@@ -5154,7 +5117,23 @@
                   <a:schemeClr val="bg1"/>
                 </a:solidFill>
               </a:rPr>
-              <a:t>ot identified</a:t>
+              <a:t>evaluated by “Clinic </a:t>
+            </a:r>
+            <a:r>
+              <a:rPr lang="en-US" sz="1400" b="1" dirty="0" err="1" smtClean="0">
+                <a:solidFill>
+                  <a:schemeClr val="bg1"/>
+                </a:solidFill>
+              </a:rPr>
+              <a:t>Questionaire</a:t>
+            </a:r>
+            <a:r>
+              <a:rPr lang="en-US" sz="1400" b="1" dirty="0" smtClean="0">
+                <a:solidFill>
+                  <a:schemeClr val="bg1"/>
+                </a:solidFill>
+              </a:rPr>
+              <a:t>”</a:t>
             </a:r>
           </a:p>
           <a:p>
@@ -5168,15 +5147,15 @@
                   <a:schemeClr val="bg1"/>
                 </a:solidFill>
               </a:rPr>
-              <a:t>Not evaluated by “Clinic </a:t>
-            </a:r>
-            <a:r>
-              <a:rPr lang="en-US" sz="1400" b="1" dirty="0" err="1" smtClean="0">
+              <a:t>No new </a:t>
+            </a:r>
+            <a:r>
+              <a:rPr lang="en-US" sz="1400" b="1" dirty="0" smtClean="0">
                 <a:solidFill>
                   <a:schemeClr val="bg1"/>
                 </a:solidFill>
               </a:rPr>
-              <a:t>Questionaire</a:t>
+              <a:t>interventions </a:t>
             </a:r>
             <a:r>
               <a:rPr lang="en-US" sz="1400" b="1" dirty="0" smtClean="0">
@@ -5184,7 +5163,23 @@
                   <a:schemeClr val="bg1"/>
                 </a:solidFill>
               </a:rPr>
-              <a:t>”</a:t>
+              <a:t> will be tried </a:t>
+            </a:r>
+            <a:r>
+              <a:rPr lang="en-US" sz="1400" b="1" dirty="0" smtClean="0">
+                <a:solidFill>
+                  <a:schemeClr val="bg1"/>
+                </a:solidFill>
+              </a:rPr>
+              <a:t>in </a:t>
+            </a:r>
+            <a:r>
+              <a:rPr lang="en-US" sz="1400" b="1" dirty="0" smtClean="0">
+                <a:solidFill>
+                  <a:schemeClr val="bg1"/>
+                </a:solidFill>
+              </a:rPr>
+              <a:t>Pilot</a:t>
             </a:r>
           </a:p>
           <a:p>
@@ -5198,7 +5193,63 @@
                   <a:schemeClr val="bg1"/>
                 </a:solidFill>
               </a:rPr>
-              <a:t>No interventions tried in Pilot</a:t>
+              <a:t>Reduced</a:t>
+            </a:r>
+            <a:r>
+              <a:rPr lang="en-US" sz="1400" b="1" dirty="0" smtClean="0">
+                <a:solidFill>
+                  <a:schemeClr val="bg1"/>
+                </a:solidFill>
+              </a:rPr>
+              <a:t> </a:t>
+            </a:r>
+            <a:r>
+              <a:rPr lang="en-US" sz="1400" b="1" dirty="0" smtClean="0">
+                <a:solidFill>
+                  <a:schemeClr val="bg1"/>
+                </a:solidFill>
+              </a:rPr>
+              <a:t>chance of </a:t>
+            </a:r>
+            <a:r>
+              <a:rPr lang="en-US" sz="1400" b="1" dirty="0" smtClean="0">
+                <a:solidFill>
+                  <a:schemeClr val="bg1"/>
+                </a:solidFill>
+              </a:rPr>
+              <a:t>improving their working situation </a:t>
+            </a:r>
+            <a:r>
+              <a:rPr lang="en-US" sz="1400" b="1" dirty="0" err="1" smtClean="0">
+                <a:solidFill>
+                  <a:schemeClr val="bg1"/>
+                </a:solidFill>
+              </a:rPr>
+              <a:t>wrt</a:t>
+            </a:r>
+            <a:r>
+              <a:rPr lang="en-US" sz="1400" b="1" dirty="0" smtClean="0">
+                <a:solidFill>
+                  <a:schemeClr val="bg1"/>
+                </a:solidFill>
+              </a:rPr>
+              <a:t>. </a:t>
+            </a:r>
+            <a:r>
+              <a:rPr lang="en-US" sz="1400" b="1" dirty="0">
+                <a:solidFill>
+                  <a:schemeClr val="bg1"/>
+                </a:solidFill>
+              </a:rPr>
+              <a:t>t</a:t>
+            </a:r>
+            <a:r>
+              <a:rPr lang="en-US" sz="1400" b="1" dirty="0" smtClean="0">
+                <a:solidFill>
+                  <a:schemeClr val="bg1"/>
+                </a:solidFill>
+              </a:rPr>
+              <a:t>hese issues</a:t>
             </a:r>
           </a:p>
           <a:p>
@@ -5212,8 +5263,13 @@
                   <a:schemeClr val="bg1"/>
                 </a:solidFill>
               </a:rPr>
-              <a:t>No chance of improvement</a:t>
-            </a:r>
+              <a:t>(Can be given voice:  - If PCs enter these issues in “OTHER” section of Clinic Questionnaire) </a:t>
+            </a:r>
+            <a:endParaRPr lang="en-US" sz="1400" b="1" dirty="0" smtClean="0">
+              <a:solidFill>
+                <a:schemeClr val="bg1"/>
+              </a:solidFill>
+            </a:endParaRPr>
           </a:p>
         </p:txBody>
       </p:sp>
@@ -5560,55 +5616,6 @@
                       </p:childTnLst>
                     </p:cTn>
                   </p:par>
-                  <p:par>
-                    <p:cTn id="29" fill="hold">
-                      <p:stCondLst>
-                        <p:cond delay="indefinite"/>
-                      </p:stCondLst>
-                      <p:childTnLst>
-                        <p:par>
-                          <p:cTn id="30" fill="hold">
-                            <p:stCondLst>
-                              <p:cond delay="0"/>
-                            </p:stCondLst>
-                            <p:childTnLst>
-                              <p:par>
-                                <p:cTn id="31" presetID="1" presetClass="entr" presetSubtype="0" fill="hold" nodeType="clickEffect">
-                                  <p:stCondLst>
-                                    <p:cond delay="0"/>
-                                  </p:stCondLst>
-                                  <p:childTnLst>
-                                    <p:set>
-                                      <p:cBhvr>
-                                        <p:cTn id="32" dur="1" fill="hold">
-                                          <p:stCondLst>
-                                            <p:cond delay="0"/>
-                                          </p:stCondLst>
-                                        </p:cTn>
-                                        <p:tgtEl>
-                                          <p:spTgt spid="3">
-                                            <p:txEl>
-                                              <p:pRg st="8" end="8"/>
-                                            </p:txEl>
-                                          </p:spTgt>
-                                        </p:tgtEl>
-                                        <p:attrNameLst>
-                                          <p:attrName>style.visibility</p:attrName>
-                                        </p:attrNameLst>
-                                      </p:cBhvr>
-                                      <p:to>
-                                        <p:strVal val="visible"/>
-                                      </p:to>
-                                    </p:set>
-                                  </p:childTnLst>
-                                </p:cTn>
-                              </p:par>
-                            </p:childTnLst>
-                          </p:cTn>
-                        </p:par>
-                      </p:childTnLst>
-                    </p:cTn>
-                  </p:par>
                 </p:childTnLst>
               </p:cTn>
               <p:prevCondLst>
@@ -5675,15 +5682,7 @@
           <a:p>
             <a:r>
               <a:rPr lang="en-US" sz="3100" dirty="0" smtClean="0"/>
-              <a:t>Improving Patient </a:t>
-            </a:r>
-            <a:r>
-              <a:rPr lang="en-US" sz="3100" dirty="0" smtClean="0"/>
-              <a:t>Flow/Care </a:t>
-            </a:r>
-            <a:r>
-              <a:rPr lang="en-US" sz="3100" dirty="0" smtClean="0"/>
-              <a:t>In Clinics</a:t>
+              <a:t>Improving Patient Flow/Care In Clinics</a:t>
             </a:r>
             <a:br>
               <a:rPr lang="en-US" sz="3100" dirty="0" smtClean="0"/>
@@ -5805,8 +5804,13 @@
             </a:r>
             <a:r>
               <a:rPr lang="en-US" b="1" dirty="0" smtClean="0"/>
-              <a:t> completed</a:t>
-            </a:r>
+              <a:t> </a:t>
+            </a:r>
+            <a:r>
+              <a:rPr lang="en-US" b="1" dirty="0" smtClean="0"/>
+              <a:t>completed by Mentis</a:t>
+            </a:r>
+            <a:endParaRPr lang="en-US" b="1" dirty="0" smtClean="0"/>
           </a:p>
           <a:p>
             <a:r>
@@ -5912,9 +5916,16 @@
             <a:pPr lvl="2"/>
             <a:r>
               <a:rPr lang="en-US" b="1" dirty="0" smtClean="0"/>
-              <a:t>?Staff copy onto desktop from common server, ?? Staff give computer No to IT who place on Desktop</a:t>
-            </a:r>
-            <a:endParaRPr lang="en-US" b="1" dirty="0" smtClean="0"/>
+              <a:t>?Staff copy onto desktop from common </a:t>
+            </a:r>
+            <a:r>
+              <a:rPr lang="en-US" b="1" dirty="0" smtClean="0"/>
+              <a:t>server/memory stick  </a:t>
+            </a:r>
+            <a:r>
+              <a:rPr lang="en-US" b="1" dirty="0" smtClean="0"/>
+              <a:t>?? Staff give computer No to IT who place on Desktop</a:t>
+            </a:r>
           </a:p>
           <a:p>
             <a:pPr lvl="1">
@@ -5937,7 +5948,77 @@
             </a:r>
             <a:r>
               <a:rPr lang="en-US" b="1" dirty="0" smtClean="0"/>
-              <a:t>in Real-Time in Pilot-Clinics, by MDs and PCs</a:t>
+              <a:t>in </a:t>
+            </a:r>
+            <a:r>
+              <a:rPr lang="en-US" b="1" dirty="0" smtClean="0"/>
+              <a:t>Real-Time, over two weeks </a:t>
+            </a:r>
+            <a:r>
+              <a:rPr lang="en-US" b="1" dirty="0" smtClean="0"/>
+              <a:t>in Pilot-Clinics, by MDs and PCs</a:t>
+            </a:r>
+          </a:p>
+          <a:p>
+            <a:r>
+              <a:rPr lang="en-US" b="1" smtClean="0">
+                <a:solidFill>
+                  <a:srgbClr val="FFFF00"/>
+                </a:solidFill>
+              </a:rPr>
+              <a:t>Pre-Pilot </a:t>
+            </a:r>
+            <a:r>
+              <a:rPr lang="en-US" b="1" dirty="0" smtClean="0">
+                <a:solidFill>
+                  <a:srgbClr val="FFFF00"/>
+                </a:solidFill>
+              </a:rPr>
+              <a:t>Questionnaire Analysis </a:t>
+            </a:r>
+            <a:r>
+              <a:rPr lang="en-US" b="1" dirty="0" smtClean="0"/>
+              <a:t>(Mentis)</a:t>
+            </a:r>
+          </a:p>
+          <a:p>
+            <a:r>
+              <a:rPr lang="en-US" b="1" dirty="0" smtClean="0">
+                <a:solidFill>
+                  <a:srgbClr val="FFFF00"/>
+                </a:solidFill>
+              </a:rPr>
+              <a:t>Formulation of Pilot Interventions </a:t>
+            </a:r>
+            <a:r>
+              <a:rPr lang="en-US" b="1" dirty="0" smtClean="0"/>
+              <a:t>based on results of analysis</a:t>
+            </a:r>
+            <a:r>
+              <a:rPr lang="en-US" b="1" dirty="0" smtClean="0">
+                <a:solidFill>
+                  <a:srgbClr val="FFFF00"/>
+                </a:solidFill>
+              </a:rPr>
+              <a:t> </a:t>
+            </a:r>
+            <a:r>
+              <a:rPr lang="en-US" b="1" dirty="0" smtClean="0"/>
+              <a:t>(Mentis)</a:t>
+            </a:r>
+          </a:p>
+          <a:p>
+            <a:r>
+              <a:rPr lang="en-US" b="1" dirty="0" smtClean="0">
+                <a:solidFill>
+                  <a:srgbClr val="FFFF00"/>
+                </a:solidFill>
+              </a:rPr>
+              <a:t>‘Pilot Interventions’ Meeting </a:t>
+            </a:r>
+            <a:r>
+              <a:rPr lang="en-US" b="1" dirty="0" smtClean="0"/>
+              <a:t>– finalize:</a:t>
             </a:r>
           </a:p>
           <a:p>
@@ -5947,62 +6028,7 @@
             </a:pPr>
             <a:r>
               <a:rPr lang="en-US" b="1" dirty="0" smtClean="0"/>
-              <a:t>By MDs/PCs during day in pilot clinics during two  one-week periods</a:t>
-            </a:r>
-            <a:endParaRPr lang="en-US" b="1" dirty="0" smtClean="0"/>
-          </a:p>
-          <a:p>
-            <a:r>
-              <a:rPr lang="en-US" b="1" dirty="0" smtClean="0">
-                <a:solidFill>
-                  <a:srgbClr val="FFFF00"/>
-                </a:solidFill>
-              </a:rPr>
-              <a:t>Pre-Pilot Questionnaire Analysis </a:t>
-            </a:r>
-            <a:r>
-              <a:rPr lang="en-US" b="1" dirty="0" smtClean="0"/>
-              <a:t>(Mentis)</a:t>
-            </a:r>
-          </a:p>
-          <a:p>
-            <a:r>
-              <a:rPr lang="en-US" b="1" dirty="0" smtClean="0">
-                <a:solidFill>
-                  <a:srgbClr val="FFFF00"/>
-                </a:solidFill>
-              </a:rPr>
-              <a:t>Formulation of Pilot Interventions </a:t>
-            </a:r>
-            <a:r>
-              <a:rPr lang="en-US" b="1" dirty="0" smtClean="0"/>
-              <a:t>based on results of analysis</a:t>
-            </a:r>
-            <a:r>
-              <a:rPr lang="en-US" b="1" dirty="0" smtClean="0">
-                <a:solidFill>
-                  <a:srgbClr val="FFFF00"/>
-                </a:solidFill>
-              </a:rPr>
-              <a:t> </a:t>
-            </a:r>
-            <a:r>
-              <a:rPr lang="en-US" b="1" dirty="0" smtClean="0"/>
-              <a:t>(Mentis)</a:t>
-            </a:r>
-          </a:p>
-          <a:p>
-            <a:r>
-              <a:rPr lang="en-US" b="1" dirty="0" smtClean="0">
-                <a:solidFill>
-                  <a:srgbClr val="FFFF00"/>
-                </a:solidFill>
-              </a:rPr>
-              <a:t>‘Pilot Interventions’ Meeting </a:t>
-            </a:r>
-            <a:r>
-              <a:rPr lang="en-US" b="1" dirty="0" smtClean="0"/>
-              <a:t>– finalize:</a:t>
+              <a:t>What interventions to implement</a:t>
             </a:r>
           </a:p>
           <a:p>
@@ -6012,7 +6038,7 @@
             </a:pPr>
             <a:r>
               <a:rPr lang="en-US" b="1" dirty="0" smtClean="0"/>
-              <a:t>What interventions to implement</a:t>
+              <a:t>How to make implementations</a:t>
             </a:r>
           </a:p>
           <a:p>
@@ -6022,7 +6048,80 @@
             </a:pPr>
             <a:r>
               <a:rPr lang="en-US" b="1" dirty="0" smtClean="0"/>
-              <a:t>How to make implementations</a:t>
+              <a:t>How long implementation need to be in place for any benefit to be </a:t>
+            </a:r>
+            <a:r>
+              <a:rPr lang="en-US" b="1" dirty="0" smtClean="0"/>
+              <a:t>seen</a:t>
+            </a:r>
+          </a:p>
+          <a:p>
+            <a:r>
+              <a:rPr lang="en-US" b="1" dirty="0" smtClean="0">
+                <a:solidFill>
+                  <a:srgbClr val="FFFF00"/>
+                </a:solidFill>
+              </a:rPr>
+              <a:t>Implement Pilot </a:t>
+            </a:r>
+            <a:r>
+              <a:rPr lang="en-US" b="1" dirty="0" smtClean="0"/>
+              <a:t>– Institute changes into chosen clinics for chosen amount of time</a:t>
+            </a:r>
+            <a:endParaRPr lang="en-US" b="1" dirty="0" smtClean="0"/>
+          </a:p>
+          <a:p>
+            <a:r>
+              <a:rPr lang="en-US" b="1" dirty="0" smtClean="0">
+                <a:solidFill>
+                  <a:srgbClr val="FFFF00"/>
+                </a:solidFill>
+              </a:rPr>
+              <a:t>Post-Pilot Questionnaire Completion (after implementation ) </a:t>
+            </a:r>
+            <a:r>
+              <a:rPr lang="en-US" b="1" dirty="0" smtClean="0"/>
+              <a:t> AT ALL CLINICS not just Pilot sites</a:t>
+            </a:r>
+          </a:p>
+          <a:p>
+            <a:r>
+              <a:rPr lang="en-US" b="1" dirty="0" smtClean="0">
+                <a:solidFill>
+                  <a:srgbClr val="FFFF00"/>
+                </a:solidFill>
+              </a:rPr>
+              <a:t>Analyze Pre- and Post-Pilot Questionnaires’  </a:t>
+            </a:r>
+            <a:r>
+              <a:rPr lang="en-US" b="1" dirty="0" smtClean="0"/>
+              <a:t>(Mentis)</a:t>
+            </a:r>
+          </a:p>
+          <a:p>
+            <a:r>
+              <a:rPr lang="en-US" b="1" dirty="0" smtClean="0">
+                <a:solidFill>
+                  <a:srgbClr val="FFFF00"/>
+                </a:solidFill>
+              </a:rPr>
+              <a:t>Pilot Results </a:t>
+            </a:r>
+            <a:r>
+              <a:rPr lang="en-US" b="1" dirty="0" smtClean="0">
+                <a:solidFill>
+                  <a:srgbClr val="FFFF00"/>
+                </a:solidFill>
+              </a:rPr>
+              <a:t>Meeting  - </a:t>
+            </a:r>
+            <a:r>
+              <a:rPr lang="en-US" b="1" dirty="0" smtClean="0"/>
+              <a:t>Present </a:t>
+            </a:r>
+            <a:r>
+              <a:rPr lang="en-US" b="1" dirty="0" smtClean="0"/>
+              <a:t>Results of Pilot Interventions</a:t>
             </a:r>
           </a:p>
           <a:p>
@@ -6032,97 +6131,27 @@
             </a:pPr>
             <a:r>
               <a:rPr lang="en-US" b="1" dirty="0" smtClean="0"/>
-              <a:t>How long implementation need to be in place for any benefit to be seen</a:t>
-            </a:r>
-          </a:p>
-          <a:p>
-            <a:r>
-              <a:rPr lang="en-US" b="1" dirty="0" smtClean="0">
-                <a:solidFill>
-                  <a:srgbClr val="FFFF00"/>
-                </a:solidFill>
-              </a:rPr>
-              <a:t>Post-Pilot Questionnaire Completion (after implementation ) </a:t>
-            </a:r>
+              <a:t>If Statistically Significant Improvement found:</a:t>
+            </a:r>
+          </a:p>
+          <a:p>
+            <a:pPr lvl="2"/>
             <a:r>
               <a:rPr lang="en-US" b="1" dirty="0" smtClean="0"/>
-              <a:t> AT ALL CLINICS not just Pilot sites</a:t>
-            </a:r>
-          </a:p>
-          <a:p>
-            <a:r>
-              <a:rPr lang="en-US" b="1" dirty="0" smtClean="0">
-                <a:solidFill>
-                  <a:srgbClr val="FFFF00"/>
-                </a:solidFill>
-              </a:rPr>
-              <a:t>Analyze Pre- and Post-Pilot Questionnaires’  </a:t>
+              <a:t>How to present this information To Albany to get whatever is necessary </a:t>
             </a:r>
             <a:r>
               <a:rPr lang="en-US" b="1" dirty="0" smtClean="0"/>
-              <a:t>(Mentis)</a:t>
-            </a:r>
-          </a:p>
-          <a:p>
-            <a:r>
-              <a:rPr lang="en-US" b="1" dirty="0" smtClean="0">
-                <a:solidFill>
-                  <a:srgbClr val="FFFF00"/>
-                </a:solidFill>
-              </a:rPr>
-              <a:t>Pilot Results Meeting</a:t>
-            </a:r>
-          </a:p>
-          <a:p>
-            <a:pPr lvl="1">
-              <a:buFont typeface="Arial" panose="020B0604020202020204" pitchFamily="34" charset="0"/>
-              <a:buChar char="•"/>
-            </a:pPr>
+              <a:t>to IMPROVE </a:t>
+            </a:r>
             <a:r>
               <a:rPr lang="en-US" b="1" dirty="0" smtClean="0"/>
-              <a:t>Present Results of Pilot Interventions</a:t>
-            </a:r>
-          </a:p>
-          <a:p>
-            <a:pPr lvl="1">
-              <a:buFont typeface="Arial" panose="020B0604020202020204" pitchFamily="34" charset="0"/>
-              <a:buChar char="•"/>
-            </a:pPr>
+              <a:t>PATIENT FLOW/CARE  IN </a:t>
+            </a:r>
             <a:r>
               <a:rPr lang="en-US" b="1" dirty="0" smtClean="0"/>
-              <a:t>If Statistically Significant Improvement found:</a:t>
-            </a:r>
-          </a:p>
-          <a:p>
-            <a:pPr lvl="2"/>
-            <a:r>
-              <a:rPr lang="en-US" b="1" dirty="0" smtClean="0"/>
-              <a:t>How to present this information To Albany to get whatever is necessary to</a:t>
-            </a:r>
-          </a:p>
-          <a:p>
-            <a:pPr lvl="2"/>
-            <a:r>
-              <a:rPr lang="en-US" b="1" smtClean="0"/>
-              <a:t>IMPROVE </a:t>
-            </a:r>
-            <a:r>
-              <a:rPr lang="en-US" b="1" dirty="0" smtClean="0"/>
-              <a:t>PATIENT FLOW/CARE  IN CLINICS</a:t>
-            </a:r>
-          </a:p>
-          <a:p>
-            <a:pPr lvl="1">
-              <a:buFont typeface="Arial" panose="020B0604020202020204" pitchFamily="34" charset="0"/>
-              <a:buChar char="•"/>
-            </a:pPr>
-            <a:endParaRPr lang="en-US" b="1" dirty="0" smtClean="0"/>
-          </a:p>
-          <a:p>
-            <a:endParaRPr lang="en-US" b="1" dirty="0" smtClean="0"/>
-          </a:p>
-          <a:p>
-            <a:pPr lvl="2"/>
+              <a:t>CLINICS</a:t>
+            </a:r>
             <a:endParaRPr lang="en-US" b="1" dirty="0" smtClean="0"/>
           </a:p>
           <a:p>
@@ -7433,104 +7462,6 @@
                       </p:childTnLst>
                     </p:cTn>
                   </p:par>
-                  <p:par>
-                    <p:cTn id="107" fill="hold">
-                      <p:stCondLst>
-                        <p:cond delay="indefinite"/>
-                      </p:stCondLst>
-                      <p:childTnLst>
-                        <p:par>
-                          <p:cTn id="108" fill="hold">
-                            <p:stCondLst>
-                              <p:cond delay="0"/>
-                            </p:stCondLst>
-                            <p:childTnLst>
-                              <p:par>
-                                <p:cTn id="109" presetID="1" presetClass="entr" presetSubtype="0" fill="hold" nodeType="clickEffect">
-                                  <p:stCondLst>
-                                    <p:cond delay="0"/>
-                                  </p:stCondLst>
-                                  <p:childTnLst>
-                                    <p:set>
-                                      <p:cBhvr>
-                                        <p:cTn id="110" dur="1" fill="hold">
-                                          <p:stCondLst>
-                                            <p:cond delay="0"/>
-                                          </p:stCondLst>
-                                        </p:cTn>
-                                        <p:tgtEl>
-                                          <p:spTgt spid="3">
-                                            <p:txEl>
-                                              <p:pRg st="26" end="26"/>
-                                            </p:txEl>
-                                          </p:spTgt>
-                                        </p:tgtEl>
-                                        <p:attrNameLst>
-                                          <p:attrName>style.visibility</p:attrName>
-                                        </p:attrNameLst>
-                                      </p:cBhvr>
-                                      <p:to>
-                                        <p:strVal val="visible"/>
-                                      </p:to>
-                                    </p:set>
-                                  </p:childTnLst>
-                                </p:cTn>
-                              </p:par>
-                            </p:childTnLst>
-                          </p:cTn>
-                        </p:par>
-                      </p:childTnLst>
-                    </p:cTn>
-                  </p:par>
-                  <p:par>
-                    <p:cTn id="111" fill="hold">
-                      <p:stCondLst>
-                        <p:cond delay="indefinite"/>
-                      </p:stCondLst>
-                      <p:childTnLst>
-                        <p:par>
-                          <p:cTn id="112" fill="hold">
-                            <p:stCondLst>
-                              <p:cond delay="0"/>
-                            </p:stCondLst>
-                            <p:childTnLst>
-                              <p:par>
-                                <p:cTn id="113" presetID="1" presetClass="entr" presetSubtype="0" fill="hold" nodeType="clickEffect">
-                                  <p:stCondLst>
-                                    <p:cond delay="0"/>
-                                  </p:stCondLst>
-                                  <p:childTnLst>
-                                    <p:set>
-                                      <p:cBhvr>
-                                        <p:cTn id="114" dur="1" fill="hold">
-                                          <p:stCondLst>
-                                            <p:cond delay="0"/>
-                                          </p:stCondLst>
-                                        </p:cTn>
-                                        <p:tgtEl>
-                                          <p:spTgt spid="3">
-                                            <p:txEl>
-                                              <p:pRg st="27" end="27"/>
-                                            </p:txEl>
-                                          </p:spTgt>
-                                        </p:tgtEl>
-                                        <p:attrNameLst>
-                                          <p:attrName>style.visibility</p:attrName>
-                                        </p:attrNameLst>
-                                      </p:cBhvr>
-                                      <p:to>
-                                        <p:strVal val="visible"/>
-                                      </p:to>
-                                    </p:set>
-                                  </p:childTnLst>
-                                </p:cTn>
-                              </p:par>
-                            </p:childTnLst>
-                          </p:cTn>
-                        </p:par>
-                      </p:childTnLst>
-                    </p:cTn>
-                  </p:par>
                 </p:childTnLst>
               </p:cTn>
               <p:prevCondLst>

</xml_diff>

<commit_message>
Remove old excel, refin presentation
</commit_message>
<xml_diff>
--- a/Clinics7_7_16.pptx
+++ b/Clinics7_7_16.pptx
@@ -110,7 +110,7 @@
   </p:defaultTextStyle>
   <p:extLst>
     <p:ext uri="{EFAFB233-063F-42B5-8137-9DF3F51BA10A}">
-      <p15:sldGuideLst xmlns:p15="http://schemas.microsoft.com/office/powerpoint/2012/main" xmlns="">
+      <p15:sldGuideLst xmlns="" xmlns:p15="http://schemas.microsoft.com/office/powerpoint/2012/main">
         <p15:guide id="1" orient="horz" pos="2160">
           <p15:clr>
             <a:srgbClr val="A4A3A4"/>
@@ -3199,15 +3199,7 @@
             </a:br>
             <a:r>
               <a:rPr lang="en-US" sz="2000" dirty="0" smtClean="0"/>
-              <a:t>Methodology and Progress </a:t>
-            </a:r>
-            <a:r>
-              <a:rPr lang="en-US" sz="2000" dirty="0" smtClean="0"/>
-              <a:t> - So </a:t>
-            </a:r>
-            <a:r>
-              <a:rPr lang="en-US" sz="2000" dirty="0" smtClean="0"/>
-              <a:t>Far</a:t>
+              <a:t>Methodology and Progress  - So Far</a:t>
             </a:r>
             <a:br>
               <a:rPr lang="en-US" sz="2000" dirty="0" smtClean="0"/>
@@ -5060,15 +5052,7 @@
                   <a:schemeClr val="bg1"/>
                 </a:solidFill>
               </a:rPr>
-              <a:t>I think this is summary </a:t>
-            </a:r>
-            <a:r>
-              <a:rPr lang="en-US" sz="1400" b="1" dirty="0" smtClean="0">
-                <a:solidFill>
-                  <a:schemeClr val="bg1"/>
-                </a:solidFill>
-              </a:rPr>
-              <a:t>of data from original 5/11/16 meeting</a:t>
+              <a:t>I think this is summary of data from original 5/11/16 meeting</a:t>
             </a:r>
           </a:p>
           <a:p>
@@ -5082,21 +5066,8 @@
                   <a:schemeClr val="bg1"/>
                 </a:solidFill>
               </a:rPr>
-              <a:t>If  true </a:t>
-            </a:r>
-            <a:r>
-              <a:rPr lang="en-US" sz="1400" b="1" dirty="0" smtClean="0">
-                <a:solidFill>
-                  <a:schemeClr val="bg1"/>
-                </a:solidFill>
-              </a:rPr>
-              <a:t>that PCs have problems that have not been identified then:</a:t>
-            </a:r>
-            <a:endParaRPr lang="en-US" sz="1400" b="1" dirty="0" smtClean="0">
-              <a:solidFill>
-                <a:schemeClr val="bg1"/>
-              </a:solidFill>
-            </a:endParaRPr>
+              <a:t>If  true that PCs have problems that have not been identified then:</a:t>
+            </a:r>
           </a:p>
           <a:p>
             <a:pPr marL="742950" lvl="1" indent="-285750">
@@ -5109,15 +5080,7 @@
                   <a:schemeClr val="bg1"/>
                 </a:solidFill>
               </a:rPr>
-              <a:t>Not </a:t>
-            </a:r>
-            <a:r>
-              <a:rPr lang="en-US" sz="1400" b="1" dirty="0" smtClean="0">
-                <a:solidFill>
-                  <a:schemeClr val="bg1"/>
-                </a:solidFill>
-              </a:rPr>
-              <a:t>evaluated by “Clinic </a:t>
+              <a:t>Not evaluated by “Clinic </a:t>
             </a:r>
             <a:r>
               <a:rPr lang="en-US" sz="1400" b="1" dirty="0" err="1" smtClean="0">
@@ -5147,39 +5110,7 @@
                   <a:schemeClr val="bg1"/>
                 </a:solidFill>
               </a:rPr>
-              <a:t>No new </a:t>
-            </a:r>
-            <a:r>
-              <a:rPr lang="en-US" sz="1400" b="1" dirty="0" smtClean="0">
-                <a:solidFill>
-                  <a:schemeClr val="bg1"/>
-                </a:solidFill>
-              </a:rPr>
-              <a:t>interventions </a:t>
-            </a:r>
-            <a:r>
-              <a:rPr lang="en-US" sz="1400" b="1" dirty="0" smtClean="0">
-                <a:solidFill>
-                  <a:schemeClr val="bg1"/>
-                </a:solidFill>
-              </a:rPr>
-              <a:t> will be tried </a:t>
-            </a:r>
-            <a:r>
-              <a:rPr lang="en-US" sz="1400" b="1" dirty="0" smtClean="0">
-                <a:solidFill>
-                  <a:schemeClr val="bg1"/>
-                </a:solidFill>
-              </a:rPr>
-              <a:t>in </a:t>
-            </a:r>
-            <a:r>
-              <a:rPr lang="en-US" sz="1400" b="1" dirty="0" smtClean="0">
-                <a:solidFill>
-                  <a:schemeClr val="bg1"/>
-                </a:solidFill>
-              </a:rPr>
-              <a:t>Pilot</a:t>
+              <a:t>No new interventions  will be tried in Pilot</a:t>
             </a:r>
           </a:p>
           <a:p>
@@ -5193,31 +5124,7 @@
                   <a:schemeClr val="bg1"/>
                 </a:solidFill>
               </a:rPr>
-              <a:t>Reduced</a:t>
-            </a:r>
-            <a:r>
-              <a:rPr lang="en-US" sz="1400" b="1" dirty="0" smtClean="0">
-                <a:solidFill>
-                  <a:schemeClr val="bg1"/>
-                </a:solidFill>
-              </a:rPr>
-              <a:t> </a:t>
-            </a:r>
-            <a:r>
-              <a:rPr lang="en-US" sz="1400" b="1" dirty="0" smtClean="0">
-                <a:solidFill>
-                  <a:schemeClr val="bg1"/>
-                </a:solidFill>
-              </a:rPr>
-              <a:t>chance of </a:t>
-            </a:r>
-            <a:r>
-              <a:rPr lang="en-US" sz="1400" b="1" dirty="0" smtClean="0">
-                <a:solidFill>
-                  <a:schemeClr val="bg1"/>
-                </a:solidFill>
-              </a:rPr>
-              <a:t>improving their working situation </a:t>
+              <a:t>Reduced chance of improving their working situation </a:t>
             </a:r>
             <a:r>
               <a:rPr lang="en-US" sz="1400" b="1" dirty="0" err="1" smtClean="0">
@@ -5265,11 +5172,6 @@
               </a:rPr>
               <a:t>(Can be given voice:  - If PCs enter these issues in “OTHER” section of Clinic Questionnaire) </a:t>
             </a:r>
-            <a:endParaRPr lang="en-US" sz="1400" b="1" dirty="0" smtClean="0">
-              <a:solidFill>
-                <a:schemeClr val="bg1"/>
-              </a:solidFill>
-            </a:endParaRPr>
           </a:p>
         </p:txBody>
       </p:sp>
@@ -5804,13 +5706,8 @@
             </a:r>
             <a:r>
               <a:rPr lang="en-US" b="1" dirty="0" smtClean="0"/>
-              <a:t> </a:t>
-            </a:r>
-            <a:r>
-              <a:rPr lang="en-US" b="1" dirty="0" smtClean="0"/>
-              <a:t>completed by Mentis</a:t>
-            </a:r>
-            <a:endParaRPr lang="en-US" b="1" dirty="0" smtClean="0"/>
+              <a:t> completed by Mentis</a:t>
+            </a:r>
           </a:p>
           <a:p>
             <a:r>
@@ -5849,8 +5746,24 @@
             </a:pPr>
             <a:r>
               <a:rPr lang="en-US" b="1" dirty="0" smtClean="0"/>
-              <a:t>Show and revise Clinic Questionnaire</a:t>
-            </a:r>
+              <a:t>Show and revise Clinic </a:t>
+            </a:r>
+            <a:r>
+              <a:rPr lang="en-US" b="1" dirty="0" smtClean="0"/>
+              <a:t>Questionnaire</a:t>
+            </a:r>
+          </a:p>
+          <a:p>
+            <a:pPr lvl="2"/>
+            <a:r>
+              <a:rPr lang="en-US" b="1" dirty="0" smtClean="0"/>
+              <a:t>Aim: Identify and Quantify Problems in real-time.  Validate against Staff Perceptions </a:t>
+            </a:r>
+            <a:r>
+              <a:rPr lang="en-US" b="1" smtClean="0"/>
+              <a:t>of problems</a:t>
+            </a:r>
+            <a:endParaRPr lang="en-US" b="1" dirty="0" smtClean="0"/>
           </a:p>
           <a:p>
             <a:pPr lvl="1">
@@ -5916,15 +5829,7 @@
             <a:pPr lvl="2"/>
             <a:r>
               <a:rPr lang="en-US" b="1" dirty="0" smtClean="0"/>
-              <a:t>?Staff copy onto desktop from common </a:t>
-            </a:r>
-            <a:r>
-              <a:rPr lang="en-US" b="1" dirty="0" smtClean="0"/>
-              <a:t>server/memory stick  </a:t>
-            </a:r>
-            <a:r>
-              <a:rPr lang="en-US" b="1" dirty="0" smtClean="0"/>
-              <a:t>?? Staff give computer No to IT who place on Desktop</a:t>
+              <a:t>?Staff copy onto desktop from common server/memory stick  ?? Staff give computer No to IT who place on Desktop</a:t>
             </a:r>
           </a:p>
           <a:p>
@@ -5948,33 +5853,17 @@
             </a:r>
             <a:r>
               <a:rPr lang="en-US" b="1" dirty="0" smtClean="0"/>
-              <a:t>in </a:t>
-            </a:r>
-            <a:r>
-              <a:rPr lang="en-US" b="1" dirty="0" smtClean="0"/>
-              <a:t>Real-Time, over two weeks </a:t>
-            </a:r>
-            <a:r>
-              <a:rPr lang="en-US" b="1" dirty="0" smtClean="0"/>
-              <a:t>in Pilot-Clinics, by MDs and PCs</a:t>
-            </a:r>
-          </a:p>
-          <a:p>
-            <a:r>
-              <a:rPr lang="en-US" b="1" smtClean="0">
+              <a:t>in Real-Time, over two weeks in Pilot-Clinics, by MDs and PCs</a:t>
+            </a:r>
+          </a:p>
+          <a:p>
+            <a:r>
+              <a:rPr lang="en-US" b="1" dirty="0" smtClean="0">
                 <a:solidFill>
                   <a:srgbClr val="FFFF00"/>
                 </a:solidFill>
               </a:rPr>
-              <a:t>Pre-Pilot </a:t>
-            </a:r>
-            <a:r>
-              <a:rPr lang="en-US" b="1" dirty="0" smtClean="0">
-                <a:solidFill>
-                  <a:srgbClr val="FFFF00"/>
-                </a:solidFill>
-              </a:rPr>
-              <a:t>Questionnaire Analysis </a:t>
+              <a:t>Pre-Pilot Questionnaire Analysis </a:t>
             </a:r>
             <a:r>
               <a:rPr lang="en-US" b="1" dirty="0" smtClean="0"/>
@@ -6048,11 +5937,7 @@
             </a:pPr>
             <a:r>
               <a:rPr lang="en-US" b="1" dirty="0" smtClean="0"/>
-              <a:t>How long implementation need to be in place for any benefit to be </a:t>
-            </a:r>
-            <a:r>
-              <a:rPr lang="en-US" b="1" dirty="0" smtClean="0"/>
-              <a:t>seen</a:t>
+              <a:t>How long implementation need to be in place for any benefit to be seen</a:t>
             </a:r>
           </a:p>
           <a:p>
@@ -6068,7 +5953,6 @@
               <a:rPr lang="en-US" b="1" dirty="0" smtClean="0"/>
               <a:t>– Institute changes into chosen clinics for chosen amount of time</a:t>
             </a:r>
-            <a:endParaRPr lang="en-US" b="1" dirty="0" smtClean="0"/>
           </a:p>
           <a:p>
             <a:r>
@@ -6105,23 +5989,11 @@
                   <a:srgbClr val="FFFF00"/>
                 </a:solidFill>
               </a:rPr>
-              <a:t>Pilot Results </a:t>
-            </a:r>
-            <a:r>
-              <a:rPr lang="en-US" b="1" dirty="0" smtClean="0">
-                <a:solidFill>
-                  <a:srgbClr val="FFFF00"/>
-                </a:solidFill>
-              </a:rPr>
-              <a:t>Meeting  - </a:t>
+              <a:t>Pilot Results Meeting  - </a:t>
             </a:r>
             <a:r>
               <a:rPr lang="en-US" b="1" dirty="0" smtClean="0"/>
-              <a:t>Present </a:t>
-            </a:r>
-            <a:r>
-              <a:rPr lang="en-US" b="1" dirty="0" smtClean="0"/>
-              <a:t>Results of Pilot Interventions</a:t>
+              <a:t>Present Results of Pilot Interventions</a:t>
             </a:r>
           </a:p>
           <a:p>
@@ -6138,21 +6010,8 @@
             <a:pPr lvl="2"/>
             <a:r>
               <a:rPr lang="en-US" b="1" dirty="0" smtClean="0"/>
-              <a:t>How to present this information To Albany to get whatever is necessary </a:t>
-            </a:r>
-            <a:r>
-              <a:rPr lang="en-US" b="1" dirty="0" smtClean="0"/>
-              <a:t>to IMPROVE </a:t>
-            </a:r>
-            <a:r>
-              <a:rPr lang="en-US" b="1" dirty="0" smtClean="0"/>
-              <a:t>PATIENT FLOW/CARE  IN </a:t>
-            </a:r>
-            <a:r>
-              <a:rPr lang="en-US" b="1" dirty="0" smtClean="0"/>
-              <a:t>CLINICS</a:t>
-            </a:r>
-            <a:endParaRPr lang="en-US" b="1" dirty="0" smtClean="0"/>
+              <a:t>How to present this information To Albany to get whatever is necessary to IMPROVE PATIENT FLOW/CARE  IN CLINICS</a:t>
+            </a:r>
           </a:p>
           <a:p>
             <a:pPr lvl="1"/>
@@ -7462,6 +7321,55 @@
                       </p:childTnLst>
                     </p:cTn>
                   </p:par>
+                  <p:par>
+                    <p:cTn id="107" fill="hold">
+                      <p:stCondLst>
+                        <p:cond delay="indefinite"/>
+                      </p:stCondLst>
+                      <p:childTnLst>
+                        <p:par>
+                          <p:cTn id="108" fill="hold">
+                            <p:stCondLst>
+                              <p:cond delay="0"/>
+                            </p:stCondLst>
+                            <p:childTnLst>
+                              <p:par>
+                                <p:cTn id="109" presetID="1" presetClass="entr" presetSubtype="0" fill="hold" nodeType="clickEffect">
+                                  <p:stCondLst>
+                                    <p:cond delay="0"/>
+                                  </p:stCondLst>
+                                  <p:childTnLst>
+                                    <p:set>
+                                      <p:cBhvr>
+                                        <p:cTn id="110" dur="1" fill="hold">
+                                          <p:stCondLst>
+                                            <p:cond delay="0"/>
+                                          </p:stCondLst>
+                                        </p:cTn>
+                                        <p:tgtEl>
+                                          <p:spTgt spid="3">
+                                            <p:txEl>
+                                              <p:pRg st="26" end="26"/>
+                                            </p:txEl>
+                                          </p:spTgt>
+                                        </p:tgtEl>
+                                        <p:attrNameLst>
+                                          <p:attrName>style.visibility</p:attrName>
+                                        </p:attrNameLst>
+                                      </p:cBhvr>
+                                      <p:to>
+                                        <p:strVal val="visible"/>
+                                      </p:to>
+                                    </p:set>
+                                  </p:childTnLst>
+                                </p:cTn>
+                              </p:par>
+                            </p:childTnLst>
+                          </p:cTn>
+                        </p:par>
+                      </p:childTnLst>
+                    </p:cTn>
+                  </p:par>
                 </p:childTnLst>
               </p:cTn>
               <p:prevCondLst>

</xml_diff>

<commit_message>
refine aims in presentation
</commit_message>
<xml_diff>
--- a/Clinics7_7_16.pptx
+++ b/Clinics7_7_16.pptx
@@ -110,7 +110,7 @@
   </p:defaultTextStyle>
   <p:extLst>
     <p:ext uri="{EFAFB233-063F-42B5-8137-9DF3F51BA10A}">
-      <p15:sldGuideLst xmlns="" xmlns:p15="http://schemas.microsoft.com/office/powerpoint/2012/main">
+      <p15:sldGuideLst xmlns:p15="http://schemas.microsoft.com/office/powerpoint/2012/main" xmlns="">
         <p15:guide id="1" orient="horz" pos="2160">
           <p15:clr>
             <a:srgbClr val="A4A3A4"/>
@@ -5746,22 +5746,25 @@
             </a:pPr>
             <a:r>
               <a:rPr lang="en-US" b="1" dirty="0" smtClean="0"/>
-              <a:t>Show and revise Clinic </a:t>
-            </a:r>
+              <a:t>Show and revise Clinic Questionnaire</a:t>
+            </a:r>
+          </a:p>
+          <a:p>
+            <a:pPr lvl="2"/>
             <a:r>
               <a:rPr lang="en-US" b="1" dirty="0" smtClean="0"/>
-              <a:t>Questionnaire</a:t>
+              <a:t>Aim: Identify and Quantify Problems in real-time.  Validate against Staff Perceptions of </a:t>
+            </a:r>
+            <a:r>
+              <a:rPr lang="en-US" b="1" dirty="0" smtClean="0"/>
+              <a:t>problems</a:t>
             </a:r>
           </a:p>
           <a:p>
             <a:pPr lvl="2"/>
             <a:r>
               <a:rPr lang="en-US" b="1" dirty="0" smtClean="0"/>
-              <a:t>Aim: Identify and Quantify Problems in real-time.  Validate against Staff Perceptions </a:t>
-            </a:r>
-            <a:r>
-              <a:rPr lang="en-US" b="1" smtClean="0"/>
-              <a:t>of problems</a:t>
+              <a:t>Quick/easy to fill out, but still be valid and comprehensive enough for data to be useful</a:t>
             </a:r>
             <a:endParaRPr lang="en-US" b="1" dirty="0" smtClean="0"/>
           </a:p>
@@ -7370,6 +7373,55 @@
                       </p:childTnLst>
                     </p:cTn>
                   </p:par>
+                  <p:par>
+                    <p:cTn id="111" fill="hold">
+                      <p:stCondLst>
+                        <p:cond delay="indefinite"/>
+                      </p:stCondLst>
+                      <p:childTnLst>
+                        <p:par>
+                          <p:cTn id="112" fill="hold">
+                            <p:stCondLst>
+                              <p:cond delay="0"/>
+                            </p:stCondLst>
+                            <p:childTnLst>
+                              <p:par>
+                                <p:cTn id="113" presetID="1" presetClass="entr" presetSubtype="0" fill="hold" nodeType="clickEffect">
+                                  <p:stCondLst>
+                                    <p:cond delay="0"/>
+                                  </p:stCondLst>
+                                  <p:childTnLst>
+                                    <p:set>
+                                      <p:cBhvr>
+                                        <p:cTn id="114" dur="1" fill="hold">
+                                          <p:stCondLst>
+                                            <p:cond delay="0"/>
+                                          </p:stCondLst>
+                                        </p:cTn>
+                                        <p:tgtEl>
+                                          <p:spTgt spid="3">
+                                            <p:txEl>
+                                              <p:pRg st="27" end="27"/>
+                                            </p:txEl>
+                                          </p:spTgt>
+                                        </p:tgtEl>
+                                        <p:attrNameLst>
+                                          <p:attrName>style.visibility</p:attrName>
+                                        </p:attrNameLst>
+                                      </p:cBhvr>
+                                      <p:to>
+                                        <p:strVal val="visible"/>
+                                      </p:to>
+                                    </p:set>
+                                  </p:childTnLst>
+                                </p:cTn>
+                              </p:par>
+                            </p:childTnLst>
+                          </p:cTn>
+                        </p:par>
+                      </p:childTnLst>
+                    </p:cTn>
+                  </p:par>
                 </p:childTnLst>
               </p:cTn>
               <p:prevCondLst>

</xml_diff>